<commit_message>
update to intro resources
</commit_message>
<xml_diff>
--- a/Day1_MAPP_Bering_Seasons_Intro.pptx
+++ b/Day1_MAPP_Bering_Seasons_Intro.pptx
@@ -6,7 +6,7 @@
     <p:sldMasterId id="2147483671" r:id="rId2"/>
   </p:sldMasterIdLst>
   <p:notesMasterIdLst>
-    <p:notesMasterId r:id="rId8"/>
+    <p:notesMasterId r:id="rId9"/>
   </p:notesMasterIdLst>
   <p:sldIdLst>
     <p:sldId id="256" r:id="rId3"/>
@@ -14,6 +14,7 @@
     <p:sldId id="260" r:id="rId5"/>
     <p:sldId id="258" r:id="rId6"/>
     <p:sldId id="259" r:id="rId7"/>
+    <p:sldId id="261" r:id="rId8"/>
   </p:sldIdLst>
   <p:sldSz cx="9144000" cy="5143500" type="screen16x9"/>
   <p:notesSz cx="6858000" cy="9144000"/>
@@ -1247,6 +1248,115 @@
     <p:extLst>
       <p:ext uri="{BB962C8B-B14F-4D97-AF65-F5344CB8AC3E}">
         <p14:creationId xmlns:p14="http://schemas.microsoft.com/office/powerpoint/2010/main" val="3070221951"/>
+      </p:ext>
+    </p:extLst>
+  </p:cSld>
+  <p:clrMapOvr>
+    <a:masterClrMapping/>
+  </p:clrMapOvr>
+</p:notes>
+</file>
+
+<file path=ppt/notesSlides/notesSlide6.xml><?xml version="1.0" encoding="utf-8"?>
+<p:notes xmlns:a="http://schemas.openxmlformats.org/drawingml/2006/main" xmlns:r="http://schemas.openxmlformats.org/officeDocument/2006/relationships" xmlns:p="http://schemas.openxmlformats.org/presentationml/2006/main" showMasterSp="0" showMasterPhAnim="0">
+  <p:cSld>
+    <p:spTree>
+      <p:nvGrpSpPr>
+        <p:cNvPr id="1" name="Shape 146"/>
+        <p:cNvGrpSpPr/>
+        <p:nvPr/>
+      </p:nvGrpSpPr>
+      <p:grpSpPr>
+        <a:xfrm>
+          <a:off x="0" y="0"/>
+          <a:ext cx="0" cy="0"/>
+          <a:chOff x="0" y="0"/>
+          <a:chExt cx="0" cy="0"/>
+        </a:xfrm>
+      </p:grpSpPr>
+      <p:sp>
+        <p:nvSpPr>
+          <p:cNvPr id="147" name="Google Shape;147;gc5433bbd1a_0_5:notes"/>
+          <p:cNvSpPr>
+            <a:spLocks noGrp="1" noRot="1" noChangeAspect="1"/>
+          </p:cNvSpPr>
+          <p:nvPr>
+            <p:ph type="sldImg" idx="2"/>
+          </p:nvPr>
+        </p:nvSpPr>
+        <p:spPr>
+          <a:xfrm>
+            <a:off x="381000" y="685800"/>
+            <a:ext cx="6096000" cy="3429000"/>
+          </a:xfrm>
+          <a:custGeom>
+            <a:avLst/>
+            <a:gdLst/>
+            <a:ahLst/>
+            <a:cxnLst/>
+            <a:rect l="l" t="t" r="r" b="b"/>
+            <a:pathLst>
+              <a:path w="120000" h="120000" extrusionOk="0">
+                <a:moveTo>
+                  <a:pt x="0" y="0"/>
+                </a:moveTo>
+                <a:lnTo>
+                  <a:pt x="120000" y="0"/>
+                </a:lnTo>
+                <a:lnTo>
+                  <a:pt x="120000" y="120000"/>
+                </a:lnTo>
+                <a:lnTo>
+                  <a:pt x="0" y="120000"/>
+                </a:lnTo>
+                <a:close/>
+              </a:path>
+            </a:pathLst>
+          </a:custGeom>
+        </p:spPr>
+      </p:sp>
+      <p:sp>
+        <p:nvSpPr>
+          <p:cNvPr id="148" name="Google Shape;148;gc5433bbd1a_0_5:notes"/>
+          <p:cNvSpPr txBox="1">
+            <a:spLocks noGrp="1"/>
+          </p:cNvSpPr>
+          <p:nvPr>
+            <p:ph type="body" idx="1"/>
+          </p:nvPr>
+        </p:nvSpPr>
+        <p:spPr>
+          <a:xfrm>
+            <a:off x="685800" y="4343400"/>
+            <a:ext cx="5486400" cy="4114800"/>
+          </a:xfrm>
+          <a:prstGeom prst="rect">
+            <a:avLst/>
+          </a:prstGeom>
+        </p:spPr>
+        <p:txBody>
+          <a:bodyPr spcFirstLastPara="1" wrap="square" lIns="91425" tIns="91425" rIns="91425" bIns="91425" anchor="t" anchorCtr="0">
+            <a:noAutofit/>
+          </a:bodyPr>
+          <a:lstStyle/>
+          <a:p>
+            <a:pPr marL="0" lvl="0" indent="0" algn="l" rtl="0">
+              <a:spcBef>
+                <a:spcPts val="0"/>
+              </a:spcBef>
+              <a:spcAft>
+                <a:spcPts val="0"/>
+              </a:spcAft>
+              <a:buNone/>
+            </a:pPr>
+            <a:endParaRPr dirty="0"/>
+          </a:p>
+        </p:txBody>
+      </p:sp>
+    </p:spTree>
+    <p:extLst>
+      <p:ext uri="{BB962C8B-B14F-4D97-AF65-F5344CB8AC3E}">
+        <p14:creationId xmlns:p14="http://schemas.microsoft.com/office/powerpoint/2010/main" val="3513480449"/>
       </p:ext>
     </p:extLst>
   </p:cSld>
@@ -17972,6 +18082,193 @@
         </p:txBody>
       </p:sp>
     </p:spTree>
+  </p:cSld>
+  <p:clrMapOvr>
+    <a:masterClrMapping/>
+  </p:clrMapOvr>
+</p:sld>
+</file>
+
+<file path=ppt/slides/slide6.xml><?xml version="1.0" encoding="utf-8"?>
+<p:sld xmlns:a="http://schemas.openxmlformats.org/drawingml/2006/main" xmlns:r="http://schemas.openxmlformats.org/officeDocument/2006/relationships" xmlns:p="http://schemas.openxmlformats.org/presentationml/2006/main">
+  <p:cSld>
+    <p:spTree>
+      <p:nvGrpSpPr>
+        <p:cNvPr id="1" name="Shape 149"/>
+        <p:cNvGrpSpPr/>
+        <p:nvPr/>
+      </p:nvGrpSpPr>
+      <p:grpSpPr>
+        <a:xfrm>
+          <a:off x="0" y="0"/>
+          <a:ext cx="0" cy="0"/>
+          <a:chOff x="0" y="0"/>
+          <a:chExt cx="0" cy="0"/>
+        </a:xfrm>
+      </p:grpSpPr>
+      <p:sp>
+        <p:nvSpPr>
+          <p:cNvPr id="150" name="Google Shape;150;p28"/>
+          <p:cNvSpPr txBox="1">
+            <a:spLocks noGrp="1"/>
+          </p:cNvSpPr>
+          <p:nvPr>
+            <p:ph type="title"/>
+          </p:nvPr>
+        </p:nvSpPr>
+        <p:spPr>
+          <a:xfrm>
+            <a:off x="311700" y="135187"/>
+            <a:ext cx="8520600" cy="572700"/>
+          </a:xfrm>
+          <a:prstGeom prst="rect">
+            <a:avLst/>
+          </a:prstGeom>
+        </p:spPr>
+        <p:txBody>
+          <a:bodyPr spcFirstLastPara="1" wrap="square" lIns="91425" tIns="91425" rIns="91425" bIns="91425" anchor="t" anchorCtr="0">
+            <a:normAutofit fontScale="90000"/>
+          </a:bodyPr>
+          <a:lstStyle/>
+          <a:p>
+            <a:pPr marL="0" lvl="0" indent="0" algn="l" rtl="0">
+              <a:spcBef>
+                <a:spcPts val="0"/>
+              </a:spcBef>
+              <a:spcAft>
+                <a:spcPts val="0"/>
+              </a:spcAft>
+              <a:buNone/>
+            </a:pPr>
+            <a:r>
+              <a:rPr lang="en" dirty="0" smtClean="0"/>
+              <a:t>R Session</a:t>
+            </a:r>
+            <a:endParaRPr dirty="0"/>
+          </a:p>
+        </p:txBody>
+      </p:sp>
+      <p:sp>
+        <p:nvSpPr>
+          <p:cNvPr id="151" name="Google Shape;151;p28"/>
+          <p:cNvSpPr txBox="1">
+            <a:spLocks noGrp="1"/>
+          </p:cNvSpPr>
+          <p:nvPr>
+            <p:ph type="body" idx="1"/>
+          </p:nvPr>
+        </p:nvSpPr>
+        <p:spPr>
+          <a:xfrm>
+            <a:off x="311700" y="421537"/>
+            <a:ext cx="8520600" cy="3416400"/>
+          </a:xfrm>
+          <a:prstGeom prst="rect">
+            <a:avLst/>
+          </a:prstGeom>
+        </p:spPr>
+        <p:txBody>
+          <a:bodyPr spcFirstLastPara="1" wrap="square" lIns="91425" tIns="91425" rIns="91425" bIns="91425" anchor="t" anchorCtr="0">
+            <a:noAutofit/>
+          </a:bodyPr>
+          <a:lstStyle/>
+          <a:p>
+            <a:pPr marL="285750" indent="-285750"/>
+            <a:endParaRPr lang="en-US" sz="1400" dirty="0" smtClean="0"/>
+          </a:p>
+          <a:p>
+            <a:pPr marL="285750" indent="-285750"/>
+            <a:r>
+              <a:rPr lang="en-US" sz="1400" dirty="0" smtClean="0"/>
+              <a:t>Examples </a:t>
+            </a:r>
+            <a:r>
+              <a:rPr lang="en-US" sz="1400" dirty="0"/>
+              <a:t>and toolbox at </a:t>
+            </a:r>
+            <a:r>
+              <a:rPr lang="en-US" sz="1400" dirty="0">
+                <a:hlinkClick r:id="rId3"/>
+              </a:rPr>
+              <a:t>https://</a:t>
+            </a:r>
+            <a:r>
+              <a:rPr lang="en-US" sz="1400" dirty="0" smtClean="0">
+                <a:hlinkClick r:id="rId3"/>
+              </a:rPr>
+              <a:t>github.com/kholsman/ACLIM2</a:t>
+            </a:r>
+            <a:endParaRPr lang="en-US" sz="1400" dirty="0" smtClean="0"/>
+          </a:p>
+          <a:p>
+            <a:pPr marL="285750" indent="-285750"/>
+            <a:endParaRPr lang="en-US" sz="1400" dirty="0" smtClean="0"/>
+          </a:p>
+          <a:p>
+            <a:pPr marL="285750" indent="-285750"/>
+            <a:r>
+              <a:rPr lang="en-US" sz="1400" dirty="0" smtClean="0"/>
+              <a:t>Scroll down to README, if desired run following code:</a:t>
+            </a:r>
+          </a:p>
+          <a:p>
+            <a:pPr marL="0" indent="0">
+              <a:buNone/>
+            </a:pPr>
+            <a:endParaRPr lang="en-US" sz="1400" dirty="0" smtClean="0"/>
+          </a:p>
+          <a:p>
+            <a:pPr marL="742950" lvl="1" indent="-285750"/>
+            <a:r>
+              <a:rPr lang="en-US" dirty="0" smtClean="0"/>
+              <a:t>Section 2.1 (Minimal Install, only works on early examples)</a:t>
+            </a:r>
+          </a:p>
+          <a:p>
+            <a:pPr marL="742950" lvl="1" indent="-285750"/>
+            <a:endParaRPr lang="en-US" dirty="0" smtClean="0"/>
+          </a:p>
+          <a:p>
+            <a:pPr marL="742950" lvl="1" indent="-285750"/>
+            <a:r>
+              <a:rPr lang="en-US" dirty="0" smtClean="0"/>
+              <a:t>Section 2.2 (Full install, choosing one of Options 1-3) and </a:t>
+            </a:r>
+          </a:p>
+          <a:p>
+            <a:pPr marL="742950" lvl="1" indent="-285750"/>
+            <a:r>
+              <a:rPr lang="en-US" dirty="0" smtClean="0"/>
+              <a:t>Section 2.3 - takes time!</a:t>
+            </a:r>
+          </a:p>
+          <a:p>
+            <a:pPr marL="1200150" lvl="2" indent="-285750"/>
+            <a:r>
+              <a:rPr lang="en-US" dirty="0" smtClean="0"/>
+              <a:t>Full install generates ~ 1GB of shapefiles and other resources</a:t>
+            </a:r>
+          </a:p>
+          <a:p>
+            <a:pPr marL="742950" lvl="1" indent="-285750"/>
+            <a:endParaRPr lang="en-US" sz="1000" dirty="0" smtClean="0"/>
+          </a:p>
+          <a:p>
+            <a:pPr marL="742950" lvl="1" indent="-285750"/>
+            <a:endParaRPr lang="en-US" sz="1000" dirty="0" smtClean="0"/>
+          </a:p>
+          <a:p>
+            <a:pPr marL="742950" lvl="1" indent="-285750"/>
+            <a:endParaRPr lang="en-US" sz="1000" dirty="0" smtClean="0"/>
+          </a:p>
+        </p:txBody>
+      </p:sp>
+    </p:spTree>
+    <p:extLst>
+      <p:ext uri="{BB962C8B-B14F-4D97-AF65-F5344CB8AC3E}">
+        <p14:creationId xmlns:p14="http://schemas.microsoft.com/office/powerpoint/2010/main" val="3455023320"/>
+      </p:ext>
+    </p:extLst>
   </p:cSld>
   <p:clrMapOvr>
     <a:masterClrMapping/>

</xml_diff>